<commit_message>
már hamarosan kész a ppt
</commit_message>
<xml_diff>
--- a/Tor browser.pptx
+++ b/Tor browser.pptx
@@ -453,7 +453,7 @@
           <a:p>
             <a:fld id="{0E8EFDA5-0697-4B4A-ADE3-8ED1328924CA}" type="datetimeFigureOut">
               <a:rPr lang="hu-HU" smtClean="0"/>
-              <a:t>2022.09.14.</a:t>
+              <a:t>2022.09.15.</a:t>
             </a:fld>
             <a:endParaRPr lang="hu-HU"/>
           </a:p>
@@ -1541,7 +1541,7 @@
           <a:p>
             <a:fld id="{0E8EFDA5-0697-4B4A-ADE3-8ED1328924CA}" type="datetimeFigureOut">
               <a:rPr lang="hu-HU" smtClean="0"/>
-              <a:t>2022.09.14.</a:t>
+              <a:t>2022.09.15.</a:t>
             </a:fld>
             <a:endParaRPr lang="hu-HU"/>
           </a:p>
@@ -2521,7 +2521,7 @@
           <a:p>
             <a:fld id="{0E8EFDA5-0697-4B4A-ADE3-8ED1328924CA}" type="datetimeFigureOut">
               <a:rPr lang="hu-HU" smtClean="0"/>
-              <a:t>2022.09.14.</a:t>
+              <a:t>2022.09.15.</a:t>
             </a:fld>
             <a:endParaRPr lang="hu-HU"/>
           </a:p>
@@ -3655,7 +3655,7 @@
           <a:p>
             <a:fld id="{0E8EFDA5-0697-4B4A-ADE3-8ED1328924CA}" type="datetimeFigureOut">
               <a:rPr lang="hu-HU" smtClean="0"/>
-              <a:t>2022.09.14.</a:t>
+              <a:t>2022.09.15.</a:t>
             </a:fld>
             <a:endParaRPr lang="hu-HU"/>
           </a:p>
@@ -4688,7 +4688,7 @@
           <a:p>
             <a:fld id="{0E8EFDA5-0697-4B4A-ADE3-8ED1328924CA}" type="datetimeFigureOut">
               <a:rPr lang="hu-HU" smtClean="0"/>
-              <a:t>2022.09.14.</a:t>
+              <a:t>2022.09.15.</a:t>
             </a:fld>
             <a:endParaRPr lang="hu-HU"/>
           </a:p>
@@ -5348,7 +5348,7 @@
           <a:p>
             <a:fld id="{0E8EFDA5-0697-4B4A-ADE3-8ED1328924CA}" type="datetimeFigureOut">
               <a:rPr lang="hu-HU" smtClean="0"/>
-              <a:t>2022.09.14.</a:t>
+              <a:t>2022.09.15.</a:t>
             </a:fld>
             <a:endParaRPr lang="hu-HU"/>
           </a:p>
@@ -6209,7 +6209,7 @@
           <a:p>
             <a:fld id="{0E8EFDA5-0697-4B4A-ADE3-8ED1328924CA}" type="datetimeFigureOut">
               <a:rPr lang="hu-HU" smtClean="0"/>
-              <a:t>2022.09.14.</a:t>
+              <a:t>2022.09.15.</a:t>
             </a:fld>
             <a:endParaRPr lang="hu-HU"/>
           </a:p>
@@ -6399,7 +6399,7 @@
           <a:p>
             <a:fld id="{0E8EFDA5-0697-4B4A-ADE3-8ED1328924CA}" type="datetimeFigureOut">
               <a:rPr lang="hu-HU" smtClean="0"/>
-              <a:t>2022.09.14.</a:t>
+              <a:t>2022.09.15.</a:t>
             </a:fld>
             <a:endParaRPr lang="hu-HU"/>
           </a:p>
@@ -7371,7 +7371,7 @@
           <a:p>
             <a:fld id="{0E8EFDA5-0697-4B4A-ADE3-8ED1328924CA}" type="datetimeFigureOut">
               <a:rPr lang="hu-HU" smtClean="0"/>
-              <a:t>2022.09.14.</a:t>
+              <a:t>2022.09.15.</a:t>
             </a:fld>
             <a:endParaRPr lang="hu-HU"/>
           </a:p>
@@ -7582,7 +7582,7 @@
           <a:p>
             <a:fld id="{0E8EFDA5-0697-4B4A-ADE3-8ED1328924CA}" type="datetimeFigureOut">
               <a:rPr lang="hu-HU" smtClean="0"/>
-              <a:t>2022.09.14.</a:t>
+              <a:t>2022.09.15.</a:t>
             </a:fld>
             <a:endParaRPr lang="hu-HU"/>
           </a:p>
@@ -8616,7 +8616,7 @@
           <a:p>
             <a:fld id="{0E8EFDA5-0697-4B4A-ADE3-8ED1328924CA}" type="datetimeFigureOut">
               <a:rPr lang="hu-HU" smtClean="0"/>
-              <a:t>2022.09.14.</a:t>
+              <a:t>2022.09.15.</a:t>
             </a:fld>
             <a:endParaRPr lang="hu-HU"/>
           </a:p>
@@ -8888,7 +8888,7 @@
           <a:p>
             <a:fld id="{0E8EFDA5-0697-4B4A-ADE3-8ED1328924CA}" type="datetimeFigureOut">
               <a:rPr lang="hu-HU" smtClean="0"/>
-              <a:t>2022.09.14.</a:t>
+              <a:t>2022.09.15.</a:t>
             </a:fld>
             <a:endParaRPr lang="hu-HU"/>
           </a:p>
@@ -9298,7 +9298,7 @@
           <a:p>
             <a:fld id="{0E8EFDA5-0697-4B4A-ADE3-8ED1328924CA}" type="datetimeFigureOut">
               <a:rPr lang="hu-HU" smtClean="0"/>
-              <a:t>2022.09.14.</a:t>
+              <a:t>2022.09.15.</a:t>
             </a:fld>
             <a:endParaRPr lang="hu-HU"/>
           </a:p>
@@ -9425,7 +9425,7 @@
           <a:p>
             <a:fld id="{0E8EFDA5-0697-4B4A-ADE3-8ED1328924CA}" type="datetimeFigureOut">
               <a:rPr lang="hu-HU" smtClean="0"/>
-              <a:t>2022.09.14.</a:t>
+              <a:t>2022.09.15.</a:t>
             </a:fld>
             <a:endParaRPr lang="hu-HU"/>
           </a:p>
@@ -9520,7 +9520,7 @@
           <a:p>
             <a:fld id="{0E8EFDA5-0697-4B4A-ADE3-8ED1328924CA}" type="datetimeFigureOut">
               <a:rPr lang="hu-HU" smtClean="0"/>
-              <a:t>2022.09.14.</a:t>
+              <a:t>2022.09.15.</a:t>
             </a:fld>
             <a:endParaRPr lang="hu-HU"/>
           </a:p>
@@ -10601,7 +10601,7 @@
           <a:p>
             <a:fld id="{0E8EFDA5-0697-4B4A-ADE3-8ED1328924CA}" type="datetimeFigureOut">
               <a:rPr lang="hu-HU" smtClean="0"/>
-              <a:t>2022.09.14.</a:t>
+              <a:t>2022.09.15.</a:t>
             </a:fld>
             <a:endParaRPr lang="hu-HU"/>
           </a:p>
@@ -11709,7 +11709,7 @@
           <a:p>
             <a:fld id="{0E8EFDA5-0697-4B4A-ADE3-8ED1328924CA}" type="datetimeFigureOut">
               <a:rPr lang="hu-HU" smtClean="0"/>
-              <a:t>2022.09.14.</a:t>
+              <a:t>2022.09.15.</a:t>
             </a:fld>
             <a:endParaRPr lang="hu-HU"/>
           </a:p>
@@ -12706,7 +12706,7 @@
           <a:p>
             <a:fld id="{0E8EFDA5-0697-4B4A-ADE3-8ED1328924CA}" type="datetimeFigureOut">
               <a:rPr lang="hu-HU" smtClean="0"/>
-              <a:t>2022.09.14.</a:t>
+              <a:t>2022.09.15.</a:t>
             </a:fld>
             <a:endParaRPr lang="hu-HU"/>
           </a:p>
@@ -13359,8 +13359,8 @@
         </p:blipFill>
         <p:spPr>
           <a:xfrm>
-            <a:off x="5397191" y="399115"/>
-            <a:ext cx="5040352" cy="3780263"/>
+            <a:off x="5380565" y="473576"/>
+            <a:ext cx="5051908" cy="3788930"/>
           </a:xfrm>
           <a:prstGeom prst="rect">
             <a:avLst/>
@@ -13377,6 +13377,25 @@
   <p:clrMapOvr>
     <a:masterClrMapping/>
   </p:clrMapOvr>
+  <mc:AlternateContent xmlns:mc="http://schemas.openxmlformats.org/markup-compatibility/2006">
+    <mc:Choice xmlns:p14="http://schemas.microsoft.com/office/powerpoint/2010/main" Requires="p14">
+      <p:transition spd="med" p14:dur="700">
+        <p:fade/>
+      </p:transition>
+    </mc:Choice>
+    <mc:Fallback>
+      <p:transition spd="med">
+        <p:fade/>
+      </p:transition>
+    </mc:Fallback>
+  </mc:AlternateContent>
+  <p:timing>
+    <p:tnLst>
+      <p:par>
+        <p:cTn id="1" dur="indefinite" restart="never" nodeType="tmRoot"/>
+      </p:par>
+    </p:tnLst>
+  </p:timing>
 </p:sld>
 </file>
 
@@ -13441,6 +13460,54 @@
           </a:bodyPr>
           <a:lstStyle/>
           <a:p>
+            <a:r>
+              <a:rPr lang="hu-HU" sz="2400" dirty="0" smtClean="0">
+                <a:latin typeface="Comic Sans MS" panose="030F0702030302020204" pitchFamily="66" charset="0"/>
+              </a:rPr>
+              <a:t>Egy keresőprogra</a:t>
+            </a:r>
+            <a:r>
+              <a:rPr lang="hu-HU" sz="2400" dirty="0" smtClean="0">
+                <a:latin typeface="Comic Sans MS" panose="030F0702030302020204" pitchFamily="66" charset="0"/>
+              </a:rPr>
+              <a:t>m</a:t>
+            </a:r>
+          </a:p>
+          <a:p>
+            <a:r>
+              <a:rPr lang="hu-HU" sz="2400" dirty="0" smtClean="0">
+                <a:latin typeface="Comic Sans MS" panose="030F0702030302020204" pitchFamily="66" charset="0"/>
+              </a:rPr>
+              <a:t>Segít elérhetetlen tartalmat találni</a:t>
+            </a:r>
+          </a:p>
+          <a:p>
+            <a:r>
+              <a:rPr lang="hu-HU" sz="2400" dirty="0" smtClean="0">
+                <a:latin typeface="Comic Sans MS" panose="030F0702030302020204" pitchFamily="66" charset="0"/>
+              </a:rPr>
+              <a:t>Miért készült eredetileg?</a:t>
+            </a:r>
+          </a:p>
+          <a:p>
+            <a:r>
+              <a:rPr lang="hu-HU" sz="2400" dirty="0" smtClean="0">
+                <a:latin typeface="Comic Sans MS" panose="030F0702030302020204" pitchFamily="66" charset="0"/>
+              </a:rPr>
+              <a:t>Hogyan működik?</a:t>
+            </a:r>
+          </a:p>
+          <a:p>
+            <a:endParaRPr lang="hu-HU" sz="2000" dirty="0" smtClean="0">
+              <a:latin typeface="Comic Sans MS" panose="030F0702030302020204" pitchFamily="66" charset="0"/>
+            </a:endParaRPr>
+          </a:p>
+          <a:p>
+            <a:endParaRPr lang="hu-HU" sz="2000" dirty="0" smtClean="0">
+              <a:latin typeface="Comic Sans MS" panose="030F0702030302020204" pitchFamily="66" charset="0"/>
+            </a:endParaRPr>
+          </a:p>
+          <a:p>
             <a:endParaRPr lang="hu-HU" sz="2000" dirty="0">
               <a:latin typeface="Comic Sans MS" panose="030F0702030302020204" pitchFamily="66" charset="0"/>
             </a:endParaRPr>
@@ -13457,6 +13524,25 @@
   <p:clrMapOvr>
     <a:masterClrMapping/>
   </p:clrMapOvr>
+  <mc:AlternateContent xmlns:mc="http://schemas.openxmlformats.org/markup-compatibility/2006">
+    <mc:Choice xmlns:p14="http://schemas.microsoft.com/office/powerpoint/2010/main" Requires="p14">
+      <p:transition spd="med" p14:dur="700">
+        <p:fade/>
+      </p:transition>
+    </mc:Choice>
+    <mc:Fallback>
+      <p:transition spd="med">
+        <p:fade/>
+      </p:transition>
+    </mc:Fallback>
+  </mc:AlternateContent>
+  <p:timing>
+    <p:tnLst>
+      <p:par>
+        <p:cTn id="1" dur="indefinite" restart="never" nodeType="tmRoot"/>
+      </p:par>
+    </p:tnLst>
+  </p:timing>
 </p:sld>
 </file>
 
@@ -13533,6 +13619,88 @@
           </a:bodyPr>
           <a:lstStyle/>
           <a:p>
+            <a:r>
+              <a:rPr lang="hu-HU" sz="2400" dirty="0" smtClean="0">
+                <a:latin typeface="Comic Sans MS" panose="030F0702030302020204" pitchFamily="66" charset="0"/>
+              </a:rPr>
+              <a:t>(P2P</a:t>
+            </a:r>
+            <a:r>
+              <a:rPr lang="hu-HU" sz="2400" dirty="0">
+                <a:latin typeface="Comic Sans MS" panose="030F0702030302020204" pitchFamily="66" charset="0"/>
+              </a:rPr>
+              <a:t>) </a:t>
+            </a:r>
+            <a:r>
+              <a:rPr lang="hu-HU" sz="2400" dirty="0" err="1">
+                <a:latin typeface="Comic Sans MS" panose="030F0702030302020204" pitchFamily="66" charset="0"/>
+              </a:rPr>
+              <a:t>overlay</a:t>
+            </a:r>
+            <a:r>
+              <a:rPr lang="hu-HU" sz="2400" dirty="0">
+                <a:latin typeface="Comic Sans MS" panose="030F0702030302020204" pitchFamily="66" charset="0"/>
+              </a:rPr>
+              <a:t> </a:t>
+            </a:r>
+            <a:r>
+              <a:rPr lang="hu-HU" sz="2400" dirty="0" err="1">
+                <a:latin typeface="Comic Sans MS" panose="030F0702030302020204" pitchFamily="66" charset="0"/>
+              </a:rPr>
+              <a:t>network</a:t>
+            </a:r>
+            <a:endParaRPr lang="hu-HU" sz="2400" dirty="0" smtClean="0">
+              <a:latin typeface="Comic Sans MS" panose="030F0702030302020204" pitchFamily="66" charset="0"/>
+            </a:endParaRPr>
+          </a:p>
+          <a:p>
+            <a:r>
+              <a:rPr lang="hu-HU" sz="2400" dirty="0">
+                <a:latin typeface="Comic Sans MS" panose="030F0702030302020204" pitchFamily="66" charset="0"/>
+              </a:rPr>
+              <a:t>Open </a:t>
+            </a:r>
+            <a:r>
+              <a:rPr lang="hu-HU" sz="2400" dirty="0" err="1">
+                <a:latin typeface="Comic Sans MS" panose="030F0702030302020204" pitchFamily="66" charset="0"/>
+              </a:rPr>
+              <a:t>source</a:t>
+            </a:r>
+            <a:r>
+              <a:rPr lang="hu-HU" sz="2400" dirty="0">
+                <a:latin typeface="Comic Sans MS" panose="030F0702030302020204" pitchFamily="66" charset="0"/>
+              </a:rPr>
+              <a:t> program</a:t>
+            </a:r>
+            <a:endParaRPr lang="hu-HU" sz="2400" dirty="0" smtClean="0">
+              <a:latin typeface="Comic Sans MS" panose="030F0702030302020204" pitchFamily="66" charset="0"/>
+            </a:endParaRPr>
+          </a:p>
+          <a:p>
+            <a:r>
+              <a:rPr lang="hu-HU" sz="2400" dirty="0" smtClean="0">
+                <a:latin typeface="Comic Sans MS" panose="030F0702030302020204" pitchFamily="66" charset="0"/>
+              </a:rPr>
+              <a:t>Nem használ sütiket</a:t>
+            </a:r>
+          </a:p>
+          <a:p>
+            <a:r>
+              <a:rPr lang="hu-HU" sz="2400" dirty="0" smtClean="0">
+                <a:latin typeface="Comic Sans MS" panose="030F0702030302020204" pitchFamily="66" charset="0"/>
+              </a:rPr>
+              <a:t>Gyengeségek</a:t>
+            </a:r>
+            <a:endParaRPr lang="hu-HU" sz="2400" dirty="0" smtClean="0">
+              <a:latin typeface="Comic Sans MS" panose="030F0702030302020204" pitchFamily="66" charset="0"/>
+            </a:endParaRPr>
+          </a:p>
+          <a:p>
+            <a:endParaRPr lang="hu-HU" sz="2000" dirty="0" smtClean="0">
+              <a:latin typeface="Comic Sans MS" panose="030F0702030302020204" pitchFamily="66" charset="0"/>
+            </a:endParaRPr>
+          </a:p>
+          <a:p>
             <a:endParaRPr lang="hu-HU" sz="2000" dirty="0">
               <a:latin typeface="Comic Sans MS" panose="030F0702030302020204" pitchFamily="66" charset="0"/>
             </a:endParaRPr>
@@ -13549,6 +13717,25 @@
   <p:clrMapOvr>
     <a:masterClrMapping/>
   </p:clrMapOvr>
+  <mc:AlternateContent xmlns:mc="http://schemas.openxmlformats.org/markup-compatibility/2006">
+    <mc:Choice xmlns:p14="http://schemas.microsoft.com/office/powerpoint/2010/main" Requires="p14">
+      <p:transition spd="med" p14:dur="700">
+        <p:fade/>
+      </p:transition>
+    </mc:Choice>
+    <mc:Fallback>
+      <p:transition spd="med">
+        <p:fade/>
+      </p:transition>
+    </mc:Fallback>
+  </mc:AlternateContent>
+  <p:timing>
+    <p:tnLst>
+      <p:par>
+        <p:cTn id="1" dur="indefinite" restart="never" nodeType="tmRoot"/>
+      </p:par>
+    </p:tnLst>
+  </p:timing>
 </p:sld>
 </file>
 
@@ -13614,18 +13801,30 @@
           <a:lstStyle/>
           <a:p>
             <a:r>
-              <a:rPr lang="hu-HU" sz="2000" smtClean="0">
+              <a:rPr lang="hu-HU" sz="2400" dirty="0" smtClean="0">
                 <a:latin typeface="Comic Sans MS" panose="030F0702030302020204" pitchFamily="66" charset="0"/>
               </a:rPr>
-              <a:t>Célja:</a:t>
+              <a:t>Célja</a:t>
             </a:r>
-            <a:endParaRPr lang="hu-HU" sz="2000" dirty="0" smtClean="0">
+            <a:r>
+              <a:rPr lang="hu-HU" sz="2400" dirty="0" smtClean="0">
+                <a:latin typeface="Comic Sans MS" panose="030F0702030302020204" pitchFamily="66" charset="0"/>
+              </a:rPr>
+              <a:t>: egy felhasználó identitásának </a:t>
+            </a:r>
+            <a:r>
+              <a:rPr lang="hu-HU" sz="2400" dirty="0" err="1" smtClean="0">
+                <a:latin typeface="Comic Sans MS" panose="030F0702030302020204" pitchFamily="66" charset="0"/>
+              </a:rPr>
+              <a:t>megörzése</a:t>
+            </a:r>
+            <a:endParaRPr lang="hu-HU" sz="2400" dirty="0" smtClean="0">
               <a:latin typeface="Comic Sans MS" panose="030F0702030302020204" pitchFamily="66" charset="0"/>
             </a:endParaRPr>
           </a:p>
           <a:p>
             <a:r>
-              <a:rPr lang="hu-HU" sz="2000" dirty="0" smtClean="0">
+              <a:rPr lang="hu-HU" sz="2400" dirty="0" smtClean="0">
                 <a:latin typeface="Comic Sans MS" panose="030F0702030302020204" pitchFamily="66" charset="0"/>
               </a:rPr>
               <a:t>Biztonságos keresés</a:t>
@@ -13633,7 +13832,7 @@
           </a:p>
           <a:p>
             <a:r>
-              <a:rPr lang="hu-HU" sz="2000" dirty="0" smtClean="0">
+              <a:rPr lang="hu-HU" sz="2400" dirty="0" smtClean="0">
                 <a:latin typeface="Comic Sans MS" panose="030F0702030302020204" pitchFamily="66" charset="0"/>
               </a:rPr>
               <a:t>Amire kíváncsi vagy, megnézheted</a:t>
@@ -13641,7 +13840,7 @@
           </a:p>
           <a:p>
             <a:r>
-              <a:rPr lang="hu-HU" sz="2000" dirty="0" smtClean="0">
+              <a:rPr lang="hu-HU" sz="2400" dirty="0" smtClean="0">
                 <a:latin typeface="Comic Sans MS" panose="030F0702030302020204" pitchFamily="66" charset="0"/>
               </a:rPr>
               <a:t>Beszélgetésre</a:t>
@@ -13649,12 +13848,12 @@
           </a:p>
           <a:p>
             <a:r>
-              <a:rPr lang="hu-HU" sz="2000" dirty="0" smtClean="0">
+              <a:rPr lang="hu-HU" sz="2400" dirty="0" smtClean="0">
                 <a:latin typeface="Comic Sans MS" panose="030F0702030302020204" pitchFamily="66" charset="0"/>
               </a:rPr>
               <a:t>Szórakoztatás</a:t>
             </a:r>
-            <a:endParaRPr lang="hu-HU" sz="2000" dirty="0">
+            <a:endParaRPr lang="hu-HU" sz="2400" dirty="0">
               <a:latin typeface="Comic Sans MS" panose="030F0702030302020204" pitchFamily="66" charset="0"/>
             </a:endParaRPr>
           </a:p>
@@ -13670,6 +13869,25 @@
   <p:clrMapOvr>
     <a:masterClrMapping/>
   </p:clrMapOvr>
+  <mc:AlternateContent xmlns:mc="http://schemas.openxmlformats.org/markup-compatibility/2006">
+    <mc:Choice xmlns:p14="http://schemas.microsoft.com/office/powerpoint/2010/main" Requires="p14">
+      <p:transition spd="med" p14:dur="700">
+        <p:fade/>
+      </p:transition>
+    </mc:Choice>
+    <mc:Fallback>
+      <p:transition spd="med">
+        <p:fade/>
+      </p:transition>
+    </mc:Fallback>
+  </mc:AlternateContent>
+  <p:timing>
+    <p:tnLst>
+      <p:par>
+        <p:cTn id="1" dur="indefinite" restart="never" nodeType="tmRoot"/>
+      </p:par>
+    </p:tnLst>
+  </p:timing>
 </p:sld>
 </file>
 
@@ -13734,7 +13952,45 @@
           </a:bodyPr>
           <a:lstStyle/>
           <a:p>
-            <a:endParaRPr lang="hu-HU" sz="2000" dirty="0">
+            <a:r>
+              <a:rPr lang="hu-HU" sz="2400" dirty="0" smtClean="0">
+                <a:latin typeface="Comic Sans MS" panose="030F0702030302020204" pitchFamily="66" charset="0"/>
+              </a:rPr>
+              <a:t>Hogyan lehet elérni?</a:t>
+            </a:r>
+          </a:p>
+          <a:p>
+            <a:r>
+              <a:rPr lang="hu-HU" sz="2400" dirty="0" smtClean="0">
+                <a:latin typeface="Comic Sans MS" panose="030F0702030302020204" pitchFamily="66" charset="0"/>
+              </a:rPr>
+              <a:t>Hogyan ajánlatos</a:t>
+            </a:r>
+            <a:r>
+              <a:rPr lang="hu-HU" sz="2400" dirty="0" smtClean="0">
+                <a:latin typeface="Comic Sans MS" panose="030F0702030302020204" pitchFamily="66" charset="0"/>
+              </a:rPr>
+              <a:t>?</a:t>
+            </a:r>
+          </a:p>
+          <a:p>
+            <a:r>
+              <a:rPr lang="hu-HU" sz="2400" dirty="0" smtClean="0">
+                <a:latin typeface="Comic Sans MS" panose="030F0702030302020204" pitchFamily="66" charset="0"/>
+              </a:rPr>
+              <a:t>Veszélyek</a:t>
+            </a:r>
+          </a:p>
+          <a:p>
+            <a:r>
+              <a:rPr lang="hu-HU" sz="2400" dirty="0" smtClean="0">
+                <a:latin typeface="Comic Sans MS" panose="030F0702030302020204" pitchFamily="66" charset="0"/>
+              </a:rPr>
+              <a:t>Előnyök</a:t>
+            </a:r>
+          </a:p>
+          <a:p>
+            <a:endParaRPr lang="hu-HU" sz="2000" dirty="0" smtClean="0">
               <a:latin typeface="Comic Sans MS" panose="030F0702030302020204" pitchFamily="66" charset="0"/>
             </a:endParaRPr>
           </a:p>
@@ -13750,6 +14006,25 @@
   <p:clrMapOvr>
     <a:masterClrMapping/>
   </p:clrMapOvr>
+  <mc:AlternateContent xmlns:mc="http://schemas.openxmlformats.org/markup-compatibility/2006">
+    <mc:Choice xmlns:p14="http://schemas.microsoft.com/office/powerpoint/2010/main" Requires="p14">
+      <p:transition spd="med" p14:dur="700">
+        <p:fade/>
+      </p:transition>
+    </mc:Choice>
+    <mc:Fallback>
+      <p:transition spd="med">
+        <p:fade/>
+      </p:transition>
+    </mc:Fallback>
+  </mc:AlternateContent>
+  <p:timing>
+    <p:tnLst>
+      <p:par>
+        <p:cTn id="1" dur="indefinite" restart="never" nodeType="tmRoot"/>
+      </p:par>
+    </p:tnLst>
+  </p:timing>
 </p:sld>
 </file>
 
@@ -13830,6 +14105,25 @@
   <p:clrMapOvr>
     <a:masterClrMapping/>
   </p:clrMapOvr>
+  <mc:AlternateContent xmlns:mc="http://schemas.openxmlformats.org/markup-compatibility/2006">
+    <mc:Choice xmlns:p14="http://schemas.microsoft.com/office/powerpoint/2010/main" Requires="p14">
+      <p:transition spd="med" p14:dur="700">
+        <p:fade/>
+      </p:transition>
+    </mc:Choice>
+    <mc:Fallback>
+      <p:transition spd="med">
+        <p:fade/>
+      </p:transition>
+    </mc:Fallback>
+  </mc:AlternateContent>
+  <p:timing>
+    <p:tnLst>
+      <p:par>
+        <p:cTn id="1" dur="indefinite" restart="never" nodeType="tmRoot"/>
+      </p:par>
+    </p:tnLst>
+  </p:timing>
 </p:sld>
 </file>
 
@@ -13895,7 +14189,7 @@
           <a:lstStyle/>
           <a:p>
             <a:r>
-              <a:rPr lang="hu-HU" sz="2000" dirty="0" smtClean="0">
+              <a:rPr lang="hu-HU" sz="2400" dirty="0" smtClean="0">
                 <a:latin typeface="Comic Sans MS" panose="030F0702030302020204" pitchFamily="66" charset="0"/>
               </a:rPr>
               <a:t>Források:</a:t>
@@ -13903,45 +14197,45 @@
           </a:p>
           <a:p>
             <a:r>
-              <a:rPr lang="hu-HU" sz="2000" dirty="0">
+              <a:rPr lang="hu-HU" sz="2400" dirty="0">
                 <a:latin typeface="Comic Sans MS" panose="030F0702030302020204" pitchFamily="66" charset="0"/>
                 <a:hlinkClick r:id="rId2"/>
               </a:rPr>
               <a:t>https://allabouttesting.org/interview-questions-answers-tor</a:t>
             </a:r>
             <a:r>
-              <a:rPr lang="hu-HU" sz="2000" dirty="0" smtClean="0">
+              <a:rPr lang="hu-HU" sz="2400" dirty="0" smtClean="0">
                 <a:latin typeface="Comic Sans MS" panose="030F0702030302020204" pitchFamily="66" charset="0"/>
                 <a:hlinkClick r:id="rId2"/>
               </a:rPr>
               <a:t>/</a:t>
             </a:r>
-            <a:endParaRPr lang="hu-HU" sz="2000" dirty="0" smtClean="0">
+            <a:endParaRPr lang="hu-HU" sz="2400" dirty="0" smtClean="0">
               <a:latin typeface="Comic Sans MS" panose="030F0702030302020204" pitchFamily="66" charset="0"/>
             </a:endParaRPr>
           </a:p>
           <a:p>
             <a:r>
-              <a:rPr lang="hu-HU" sz="2000" dirty="0">
+              <a:rPr lang="hu-HU" sz="2400" dirty="0">
                 <a:latin typeface="Comic Sans MS" panose="030F0702030302020204" pitchFamily="66" charset="0"/>
                 <a:hlinkClick r:id="rId3"/>
               </a:rPr>
               <a:t>https://</a:t>
             </a:r>
             <a:r>
-              <a:rPr lang="hu-HU" sz="2000" dirty="0" smtClean="0">
+              <a:rPr lang="hu-HU" sz="2400" dirty="0" smtClean="0">
                 <a:latin typeface="Comic Sans MS" panose="030F0702030302020204" pitchFamily="66" charset="0"/>
                 <a:hlinkClick r:id="rId3"/>
               </a:rPr>
               <a:t>www.techtarget.com/whatis/definition/TOR-third-generation-onion-routing</a:t>
             </a:r>
-            <a:endParaRPr lang="hu-HU" sz="2000" dirty="0" smtClean="0">
+            <a:endParaRPr lang="hu-HU" sz="2400" dirty="0" smtClean="0">
               <a:latin typeface="Comic Sans MS" panose="030F0702030302020204" pitchFamily="66" charset="0"/>
             </a:endParaRPr>
           </a:p>
           <a:p>
             <a:r>
-              <a:rPr lang="hu-HU" sz="2000" dirty="0" smtClean="0">
+              <a:rPr lang="hu-HU" sz="2400" dirty="0" smtClean="0">
                 <a:latin typeface="Comic Sans MS" panose="030F0702030302020204" pitchFamily="66" charset="0"/>
               </a:rPr>
               <a:t>Saját tapasztalat</a:t>
@@ -13964,6 +14258,25 @@
   <p:clrMapOvr>
     <a:masterClrMapping/>
   </p:clrMapOvr>
+  <mc:AlternateContent xmlns:mc="http://schemas.openxmlformats.org/markup-compatibility/2006">
+    <mc:Choice xmlns:p14="http://schemas.microsoft.com/office/powerpoint/2010/main" Requires="p14">
+      <p:transition spd="med" p14:dur="700">
+        <p:fade/>
+      </p:transition>
+    </mc:Choice>
+    <mc:Fallback>
+      <p:transition spd="med">
+        <p:fade/>
+      </p:transition>
+    </mc:Fallback>
+  </mc:AlternateContent>
+  <p:timing>
+    <p:tnLst>
+      <p:par>
+        <p:cTn id="1" dur="indefinite" restart="never" nodeType="tmRoot"/>
+      </p:par>
+    </p:tnLst>
+  </p:timing>
 </p:sld>
 </file>
 

</xml_diff>